<commit_message>
Dokumentaatiopäivitys + tiedostojen siistiminen
Poistettu logit
Päivitetty aikataulut jne
Siirretty tiedostoja alikansioihin
Poistettu turhia tiedostoja
</commit_message>
<xml_diff>
--- a/java/DOCS/Ryhmä 9 - Lämpötilaseuranta v2.pptx
+++ b/java/DOCS/Ryhmä 9 - Lämpötilaseuranta v2.pptx
@@ -575,7 +575,7 @@
           <a:noFill/>
           <a:extLst>
             <a:ext uri="{909E8E84-426E-40dd-AFC4-6F175D3DCCD1}">
-              <a14:hiddenFill xmlns="" xmlns:a14="http://schemas.microsoft.com/office/drawing/2010/main">
+              <a14:hiddenFill xmlns:a14="http://schemas.microsoft.com/office/drawing/2010/main" xmlns="">
                 <a:solidFill>
                   <a:srgbClr val="FFFFFF"/>
                 </a:solidFill>
@@ -635,7 +635,7 @@
             </a:ln>
             <a:extLst>
               <a:ext uri="{91240B29-F687-4f45-9708-019B960494DF}">
-                <a14:hiddenLine xmlns="" xmlns:a14="http://schemas.microsoft.com/office/drawing/2010/main" w="9525">
+                <a14:hiddenLine xmlns:a14="http://schemas.microsoft.com/office/drawing/2010/main" xmlns="" w="9525">
                   <a:solidFill>
                     <a:srgbClr val="000000"/>
                   </a:solidFill>
@@ -725,7 +725,7 @@
             </a:ln>
             <a:extLst>
               <a:ext uri="{91240B29-F687-4f45-9708-019B960494DF}">
-                <a14:hiddenLine xmlns="" xmlns:a14="http://schemas.microsoft.com/office/drawing/2010/main" w="9525">
+                <a14:hiddenLine xmlns:a14="http://schemas.microsoft.com/office/drawing/2010/main" xmlns="" w="9525">
                   <a:solidFill>
                     <a:srgbClr val="000000"/>
                   </a:solidFill>
@@ -815,7 +815,7 @@
             </a:ln>
             <a:extLst>
               <a:ext uri="{91240B29-F687-4f45-9708-019B960494DF}">
-                <a14:hiddenLine xmlns="" xmlns:a14="http://schemas.microsoft.com/office/drawing/2010/main" w="9525">
+                <a14:hiddenLine xmlns:a14="http://schemas.microsoft.com/office/drawing/2010/main" xmlns="" w="9525">
                   <a:solidFill>
                     <a:srgbClr val="000000"/>
                   </a:solidFill>
@@ -849,7 +849,7 @@
             </a:ln>
             <a:extLst>
               <a:ext uri="{91240B29-F687-4f45-9708-019B960494DF}">
-                <a14:hiddenLine xmlns="" xmlns:a14="http://schemas.microsoft.com/office/drawing/2010/main" w="9525">
+                <a14:hiddenLine xmlns:a14="http://schemas.microsoft.com/office/drawing/2010/main" xmlns="" w="9525">
                   <a:solidFill>
                     <a:srgbClr val="000000"/>
                   </a:solidFill>
@@ -939,7 +939,7 @@
             </a:ln>
             <a:extLst>
               <a:ext uri="{91240B29-F687-4f45-9708-019B960494DF}">
-                <a14:hiddenLine xmlns="" xmlns:a14="http://schemas.microsoft.com/office/drawing/2010/main" w="9525">
+                <a14:hiddenLine xmlns:a14="http://schemas.microsoft.com/office/drawing/2010/main" xmlns="" w="9525">
                   <a:solidFill>
                     <a:srgbClr val="000000"/>
                   </a:solidFill>
@@ -1001,7 +1001,7 @@
             </a:ln>
             <a:extLst>
               <a:ext uri="{91240B29-F687-4f45-9708-019B960494DF}">
-                <a14:hiddenLine xmlns="" xmlns:a14="http://schemas.microsoft.com/office/drawing/2010/main" w="9525">
+                <a14:hiddenLine xmlns:a14="http://schemas.microsoft.com/office/drawing/2010/main" xmlns="" w="9525">
                   <a:solidFill>
                     <a:srgbClr val="000000"/>
                   </a:solidFill>
@@ -1063,7 +1063,7 @@
             </a:ln>
             <a:extLst>
               <a:ext uri="{91240B29-F687-4f45-9708-019B960494DF}">
-                <a14:hiddenLine xmlns="" xmlns:a14="http://schemas.microsoft.com/office/drawing/2010/main" w="9525">
+                <a14:hiddenLine xmlns:a14="http://schemas.microsoft.com/office/drawing/2010/main" xmlns="" w="9525">
                   <a:solidFill>
                     <a:srgbClr val="000000"/>
                   </a:solidFill>
@@ -1153,7 +1153,7 @@
             </a:ln>
             <a:extLst>
               <a:ext uri="{91240B29-F687-4f45-9708-019B960494DF}">
-                <a14:hiddenLine xmlns="" xmlns:a14="http://schemas.microsoft.com/office/drawing/2010/main" w="9525">
+                <a14:hiddenLine xmlns:a14="http://schemas.microsoft.com/office/drawing/2010/main" xmlns="" w="9525">
                   <a:solidFill>
                     <a:srgbClr val="000000"/>
                   </a:solidFill>
@@ -1215,7 +1215,7 @@
             </a:ln>
             <a:extLst>
               <a:ext uri="{91240B29-F687-4f45-9708-019B960494DF}">
-                <a14:hiddenLine xmlns="" xmlns:a14="http://schemas.microsoft.com/office/drawing/2010/main" w="9525">
+                <a14:hiddenLine xmlns:a14="http://schemas.microsoft.com/office/drawing/2010/main" xmlns="" w="9525">
                   <a:solidFill>
                     <a:srgbClr val="000000"/>
                   </a:solidFill>
@@ -1277,7 +1277,7 @@
             </a:ln>
             <a:extLst>
               <a:ext uri="{91240B29-F687-4f45-9708-019B960494DF}">
-                <a14:hiddenLine xmlns="" xmlns:a14="http://schemas.microsoft.com/office/drawing/2010/main" w="9525">
+                <a14:hiddenLine xmlns:a14="http://schemas.microsoft.com/office/drawing/2010/main" xmlns="" w="9525">
                   <a:solidFill>
                     <a:srgbClr val="000000"/>
                   </a:solidFill>
@@ -1367,7 +1367,7 @@
             </a:ln>
             <a:extLst>
               <a:ext uri="{91240B29-F687-4f45-9708-019B960494DF}">
-                <a14:hiddenLine xmlns="" xmlns:a14="http://schemas.microsoft.com/office/drawing/2010/main" w="9525">
+                <a14:hiddenLine xmlns:a14="http://schemas.microsoft.com/office/drawing/2010/main" xmlns="" w="9525">
                   <a:solidFill>
                     <a:srgbClr val="000000"/>
                   </a:solidFill>
@@ -1457,7 +1457,7 @@
             </a:ln>
             <a:extLst>
               <a:ext uri="{91240B29-F687-4f45-9708-019B960494DF}">
-                <a14:hiddenLine xmlns="" xmlns:a14="http://schemas.microsoft.com/office/drawing/2010/main" w="9525">
+                <a14:hiddenLine xmlns:a14="http://schemas.microsoft.com/office/drawing/2010/main" xmlns="" w="9525">
                   <a:solidFill>
                     <a:srgbClr val="000000"/>
                   </a:solidFill>
@@ -1519,7 +1519,7 @@
             </a:ln>
             <a:extLst>
               <a:ext uri="{91240B29-F687-4f45-9708-019B960494DF}">
-                <a14:hiddenLine xmlns="" xmlns:a14="http://schemas.microsoft.com/office/drawing/2010/main" w="9525">
+                <a14:hiddenLine xmlns:a14="http://schemas.microsoft.com/office/drawing/2010/main" xmlns="" w="9525">
                   <a:solidFill>
                     <a:srgbClr val="000000"/>
                   </a:solidFill>
@@ -1629,7 +1629,7 @@
             </a:ln>
             <a:extLst>
               <a:ext uri="{91240B29-F687-4f45-9708-019B960494DF}">
-                <a14:hiddenLine xmlns="" xmlns:a14="http://schemas.microsoft.com/office/drawing/2010/main" w="9525">
+                <a14:hiddenLine xmlns:a14="http://schemas.microsoft.com/office/drawing/2010/main" xmlns="" w="9525">
                   <a:solidFill>
                     <a:srgbClr val="000000"/>
                   </a:solidFill>
@@ -1691,7 +1691,7 @@
             </a:ln>
             <a:extLst>
               <a:ext uri="{91240B29-F687-4f45-9708-019B960494DF}">
-                <a14:hiddenLine xmlns="" xmlns:a14="http://schemas.microsoft.com/office/drawing/2010/main" w="9525">
+                <a14:hiddenLine xmlns:a14="http://schemas.microsoft.com/office/drawing/2010/main" xmlns="" w="9525">
                   <a:solidFill>
                     <a:srgbClr val="000000"/>
                   </a:solidFill>
@@ -1781,7 +1781,7 @@
             </a:ln>
             <a:extLst>
               <a:ext uri="{91240B29-F687-4f45-9708-019B960494DF}">
-                <a14:hiddenLine xmlns="" xmlns:a14="http://schemas.microsoft.com/office/drawing/2010/main" w="9525">
+                <a14:hiddenLine xmlns:a14="http://schemas.microsoft.com/office/drawing/2010/main" xmlns="" w="9525">
                   <a:solidFill>
                     <a:srgbClr val="000000"/>
                   </a:solidFill>
@@ -1871,7 +1871,7 @@
             </a:ln>
             <a:extLst>
               <a:ext uri="{91240B29-F687-4f45-9708-019B960494DF}">
-                <a14:hiddenLine xmlns="" xmlns:a14="http://schemas.microsoft.com/office/drawing/2010/main" w="9525">
+                <a14:hiddenLine xmlns:a14="http://schemas.microsoft.com/office/drawing/2010/main" xmlns="" w="9525">
                   <a:solidFill>
                     <a:srgbClr val="000000"/>
                   </a:solidFill>
@@ -1933,7 +1933,7 @@
             </a:ln>
             <a:extLst>
               <a:ext uri="{91240B29-F687-4f45-9708-019B960494DF}">
-                <a14:hiddenLine xmlns="" xmlns:a14="http://schemas.microsoft.com/office/drawing/2010/main" w="9525">
+                <a14:hiddenLine xmlns:a14="http://schemas.microsoft.com/office/drawing/2010/main" xmlns="" w="9525">
                   <a:solidFill>
                     <a:srgbClr val="000000"/>
                   </a:solidFill>
@@ -2023,7 +2023,7 @@
             </a:ln>
             <a:extLst>
               <a:ext uri="{91240B29-F687-4f45-9708-019B960494DF}">
-                <a14:hiddenLine xmlns="" xmlns:a14="http://schemas.microsoft.com/office/drawing/2010/main" w="9525">
+                <a14:hiddenLine xmlns:a14="http://schemas.microsoft.com/office/drawing/2010/main" xmlns="" w="9525">
                   <a:solidFill>
                     <a:srgbClr val="000000"/>
                   </a:solidFill>
@@ -2113,7 +2113,7 @@
             </a:ln>
             <a:extLst>
               <a:ext uri="{91240B29-F687-4f45-9708-019B960494DF}">
-                <a14:hiddenLine xmlns="" xmlns:a14="http://schemas.microsoft.com/office/drawing/2010/main" w="9525">
+                <a14:hiddenLine xmlns:a14="http://schemas.microsoft.com/office/drawing/2010/main" xmlns="" w="9525">
                   <a:solidFill>
                     <a:srgbClr val="000000"/>
                   </a:solidFill>
@@ -2169,7 +2169,7 @@
             </a:ln>
             <a:extLst>
               <a:ext uri="{91240B29-F687-4f45-9708-019B960494DF}">
-                <a14:hiddenLine xmlns="" xmlns:a14="http://schemas.microsoft.com/office/drawing/2010/main" w="9525">
+                <a14:hiddenLine xmlns:a14="http://schemas.microsoft.com/office/drawing/2010/main" xmlns="" w="9525">
                   <a:solidFill>
                     <a:srgbClr val="000000"/>
                   </a:solidFill>
@@ -2259,7 +2259,7 @@
             </a:ln>
             <a:extLst>
               <a:ext uri="{91240B29-F687-4f45-9708-019B960494DF}">
-                <a14:hiddenLine xmlns="" xmlns:a14="http://schemas.microsoft.com/office/drawing/2010/main" w="9525">
+                <a14:hiddenLine xmlns:a14="http://schemas.microsoft.com/office/drawing/2010/main" xmlns="" w="9525">
                   <a:solidFill>
                     <a:srgbClr val="000000"/>
                   </a:solidFill>
@@ -2315,7 +2315,7 @@
             </a:ln>
             <a:extLst>
               <a:ext uri="{91240B29-F687-4f45-9708-019B960494DF}">
-                <a14:hiddenLine xmlns="" xmlns:a14="http://schemas.microsoft.com/office/drawing/2010/main" w="9525">
+                <a14:hiddenLine xmlns:a14="http://schemas.microsoft.com/office/drawing/2010/main" xmlns="" w="9525">
                   <a:solidFill>
                     <a:srgbClr val="000000"/>
                   </a:solidFill>
@@ -2405,7 +2405,7 @@
             </a:ln>
             <a:extLst>
               <a:ext uri="{91240B29-F687-4f45-9708-019B960494DF}">
-                <a14:hiddenLine xmlns="" xmlns:a14="http://schemas.microsoft.com/office/drawing/2010/main" w="9525">
+                <a14:hiddenLine xmlns:a14="http://schemas.microsoft.com/office/drawing/2010/main" xmlns="" w="9525">
                   <a:solidFill>
                     <a:srgbClr val="000000"/>
                   </a:solidFill>
@@ -2473,7 +2473,7 @@
             </a:ln>
             <a:extLst>
               <a:ext uri="{91240B29-F687-4f45-9708-019B960494DF}">
-                <a14:hiddenLine xmlns="" xmlns:a14="http://schemas.microsoft.com/office/drawing/2010/main" w="9525">
+                <a14:hiddenLine xmlns:a14="http://schemas.microsoft.com/office/drawing/2010/main" xmlns="" w="9525">
                   <a:solidFill>
                     <a:srgbClr val="000000"/>
                   </a:solidFill>
@@ -2563,7 +2563,7 @@
             </a:ln>
             <a:extLst>
               <a:ext uri="{91240B29-F687-4f45-9708-019B960494DF}">
-                <a14:hiddenLine xmlns="" xmlns:a14="http://schemas.microsoft.com/office/drawing/2010/main" w="9525">
+                <a14:hiddenLine xmlns:a14="http://schemas.microsoft.com/office/drawing/2010/main" xmlns="" w="9525">
                   <a:solidFill>
                     <a:srgbClr val="000000"/>
                   </a:solidFill>
@@ -2631,7 +2631,7 @@
             </a:ln>
             <a:extLst>
               <a:ext uri="{91240B29-F687-4f45-9708-019B960494DF}">
-                <a14:hiddenLine xmlns="" xmlns:a14="http://schemas.microsoft.com/office/drawing/2010/main" w="9525">
+                <a14:hiddenLine xmlns:a14="http://schemas.microsoft.com/office/drawing/2010/main" xmlns="" w="9525">
                   <a:solidFill>
                     <a:srgbClr val="000000"/>
                   </a:solidFill>
@@ -2721,7 +2721,7 @@
             </a:ln>
             <a:extLst>
               <a:ext uri="{91240B29-F687-4f45-9708-019B960494DF}">
-                <a14:hiddenLine xmlns="" xmlns:a14="http://schemas.microsoft.com/office/drawing/2010/main" w="9525">
+                <a14:hiddenLine xmlns:a14="http://schemas.microsoft.com/office/drawing/2010/main" xmlns="" w="9525">
                   <a:solidFill>
                     <a:srgbClr val="000000"/>
                   </a:solidFill>
@@ -2755,7 +2755,7 @@
             </a:ln>
             <a:extLst>
               <a:ext uri="{91240B29-F687-4f45-9708-019B960494DF}">
-                <a14:hiddenLine xmlns="" xmlns:a14="http://schemas.microsoft.com/office/drawing/2010/main" w="9525">
+                <a14:hiddenLine xmlns:a14="http://schemas.microsoft.com/office/drawing/2010/main" xmlns="" w="9525">
                   <a:solidFill>
                     <a:srgbClr val="000000"/>
                   </a:solidFill>
@@ -2845,7 +2845,7 @@
             </a:ln>
             <a:extLst>
               <a:ext uri="{91240B29-F687-4f45-9708-019B960494DF}">
-                <a14:hiddenLine xmlns="" xmlns:a14="http://schemas.microsoft.com/office/drawing/2010/main" w="9525">
+                <a14:hiddenLine xmlns:a14="http://schemas.microsoft.com/office/drawing/2010/main" xmlns="" w="9525">
                   <a:solidFill>
                     <a:srgbClr val="000000"/>
                   </a:solidFill>
@@ -2907,7 +2907,7 @@
             </a:ln>
             <a:extLst>
               <a:ext uri="{91240B29-F687-4f45-9708-019B960494DF}">
-                <a14:hiddenLine xmlns="" xmlns:a14="http://schemas.microsoft.com/office/drawing/2010/main" w="9525">
+                <a14:hiddenLine xmlns:a14="http://schemas.microsoft.com/office/drawing/2010/main" xmlns="" w="9525">
                   <a:solidFill>
                     <a:srgbClr val="000000"/>
                   </a:solidFill>
@@ -2969,7 +2969,7 @@
             </a:ln>
             <a:extLst>
               <a:ext uri="{91240B29-F687-4f45-9708-019B960494DF}">
-                <a14:hiddenLine xmlns="" xmlns:a14="http://schemas.microsoft.com/office/drawing/2010/main" w="9525">
+                <a14:hiddenLine xmlns:a14="http://schemas.microsoft.com/office/drawing/2010/main" xmlns="" w="9525">
                   <a:solidFill>
                     <a:srgbClr val="000000"/>
                   </a:solidFill>
@@ -3059,7 +3059,7 @@
             </a:ln>
             <a:extLst>
               <a:ext uri="{91240B29-F687-4f45-9708-019B960494DF}">
-                <a14:hiddenLine xmlns="" xmlns:a14="http://schemas.microsoft.com/office/drawing/2010/main" w="9525">
+                <a14:hiddenLine xmlns:a14="http://schemas.microsoft.com/office/drawing/2010/main" xmlns="" w="9525">
                   <a:solidFill>
                     <a:srgbClr val="000000"/>
                   </a:solidFill>
@@ -3127,7 +3127,7 @@
             </a:ln>
             <a:extLst>
               <a:ext uri="{91240B29-F687-4f45-9708-019B960494DF}">
-                <a14:hiddenLine xmlns="" xmlns:a14="http://schemas.microsoft.com/office/drawing/2010/main" w="9525">
+                <a14:hiddenLine xmlns:a14="http://schemas.microsoft.com/office/drawing/2010/main" xmlns="" w="9525">
                   <a:solidFill>
                     <a:srgbClr val="000000"/>
                   </a:solidFill>
@@ -3189,7 +3189,7 @@
             </a:ln>
             <a:extLst>
               <a:ext uri="{91240B29-F687-4f45-9708-019B960494DF}">
-                <a14:hiddenLine xmlns="" xmlns:a14="http://schemas.microsoft.com/office/drawing/2010/main" w="9525">
+                <a14:hiddenLine xmlns:a14="http://schemas.microsoft.com/office/drawing/2010/main" xmlns="" w="9525">
                   <a:solidFill>
                     <a:srgbClr val="000000"/>
                   </a:solidFill>
@@ -3279,7 +3279,7 @@
             </a:ln>
             <a:extLst>
               <a:ext uri="{91240B29-F687-4f45-9708-019B960494DF}">
-                <a14:hiddenLine xmlns="" xmlns:a14="http://schemas.microsoft.com/office/drawing/2010/main" w="9525">
+                <a14:hiddenLine xmlns:a14="http://schemas.microsoft.com/office/drawing/2010/main" xmlns="" w="9525">
                   <a:solidFill>
                     <a:srgbClr val="000000"/>
                   </a:solidFill>
@@ -3341,7 +3341,7 @@
             </a:ln>
             <a:extLst>
               <a:ext uri="{91240B29-F687-4f45-9708-019B960494DF}">
-                <a14:hiddenLine xmlns="" xmlns:a14="http://schemas.microsoft.com/office/drawing/2010/main" w="9525">
+                <a14:hiddenLine xmlns:a14="http://schemas.microsoft.com/office/drawing/2010/main" xmlns="" w="9525">
                   <a:solidFill>
                     <a:srgbClr val="000000"/>
                   </a:solidFill>
@@ -3431,7 +3431,7 @@
             </a:ln>
             <a:extLst>
               <a:ext uri="{91240B29-F687-4f45-9708-019B960494DF}">
-                <a14:hiddenLine xmlns="" xmlns:a14="http://schemas.microsoft.com/office/drawing/2010/main" w="9525">
+                <a14:hiddenLine xmlns:a14="http://schemas.microsoft.com/office/drawing/2010/main" xmlns="" w="9525">
                   <a:solidFill>
                     <a:srgbClr val="000000"/>
                   </a:solidFill>
@@ -3493,7 +3493,7 @@
             </a:ln>
             <a:extLst>
               <a:ext uri="{91240B29-F687-4f45-9708-019B960494DF}">
-                <a14:hiddenLine xmlns="" xmlns:a14="http://schemas.microsoft.com/office/drawing/2010/main" w="9525">
+                <a14:hiddenLine xmlns:a14="http://schemas.microsoft.com/office/drawing/2010/main" xmlns="" w="9525">
                   <a:solidFill>
                     <a:srgbClr val="000000"/>
                   </a:solidFill>
@@ -3583,7 +3583,7 @@
             </a:ln>
             <a:extLst>
               <a:ext uri="{91240B29-F687-4f45-9708-019B960494DF}">
-                <a14:hiddenLine xmlns="" xmlns:a14="http://schemas.microsoft.com/office/drawing/2010/main" w="9525">
+                <a14:hiddenLine xmlns:a14="http://schemas.microsoft.com/office/drawing/2010/main" xmlns="" w="9525">
                   <a:solidFill>
                     <a:srgbClr val="000000"/>
                   </a:solidFill>
@@ -3617,7 +3617,7 @@
             </a:ln>
             <a:extLst>
               <a:ext uri="{91240B29-F687-4f45-9708-019B960494DF}">
-                <a14:hiddenLine xmlns="" xmlns:a14="http://schemas.microsoft.com/office/drawing/2010/main" w="9525">
+                <a14:hiddenLine xmlns:a14="http://schemas.microsoft.com/office/drawing/2010/main" xmlns="" w="9525">
                   <a:solidFill>
                     <a:srgbClr val="000000"/>
                   </a:solidFill>
@@ -3682,7 +3682,7 @@
             </a:ln>
             <a:extLst>
               <a:ext uri="{91240B29-F687-4f45-9708-019B960494DF}">
-                <a14:hiddenLine xmlns="" xmlns:a14="http://schemas.microsoft.com/office/drawing/2010/main" w="9525">
+                <a14:hiddenLine xmlns:a14="http://schemas.microsoft.com/office/drawing/2010/main" xmlns="" w="9525">
                   <a:solidFill>
                     <a:srgbClr val="000000"/>
                   </a:solidFill>
@@ -3772,7 +3772,7 @@
             </a:ln>
             <a:extLst>
               <a:ext uri="{91240B29-F687-4f45-9708-019B960494DF}">
-                <a14:hiddenLine xmlns="" xmlns:a14="http://schemas.microsoft.com/office/drawing/2010/main" w="9525">
+                <a14:hiddenLine xmlns:a14="http://schemas.microsoft.com/office/drawing/2010/main" xmlns="" w="9525">
                   <a:solidFill>
                     <a:srgbClr val="000000"/>
                   </a:solidFill>
@@ -3834,7 +3834,7 @@
             </a:ln>
             <a:extLst>
               <a:ext uri="{91240B29-F687-4f45-9708-019B960494DF}">
-                <a14:hiddenLine xmlns="" xmlns:a14="http://schemas.microsoft.com/office/drawing/2010/main" w="9525">
+                <a14:hiddenLine xmlns:a14="http://schemas.microsoft.com/office/drawing/2010/main" xmlns="" w="9525">
                   <a:solidFill>
                     <a:srgbClr val="000000"/>
                   </a:solidFill>
@@ -3924,7 +3924,7 @@
             </a:ln>
             <a:extLst>
               <a:ext uri="{91240B29-F687-4f45-9708-019B960494DF}">
-                <a14:hiddenLine xmlns="" xmlns:a14="http://schemas.microsoft.com/office/drawing/2010/main" w="9525">
+                <a14:hiddenLine xmlns:a14="http://schemas.microsoft.com/office/drawing/2010/main" xmlns="" w="9525">
                   <a:solidFill>
                     <a:srgbClr val="000000"/>
                   </a:solidFill>
@@ -4014,7 +4014,7 @@
             </a:ln>
             <a:extLst>
               <a:ext uri="{91240B29-F687-4f45-9708-019B960494DF}">
-                <a14:hiddenLine xmlns="" xmlns:a14="http://schemas.microsoft.com/office/drawing/2010/main" w="9525">
+                <a14:hiddenLine xmlns:a14="http://schemas.microsoft.com/office/drawing/2010/main" xmlns="" w="9525">
                   <a:solidFill>
                     <a:srgbClr val="000000"/>
                   </a:solidFill>
@@ -4079,7 +4079,7 @@
             </a:ln>
             <a:extLst>
               <a:ext uri="{91240B29-F687-4f45-9708-019B960494DF}">
-                <a14:hiddenLine xmlns="" xmlns:a14="http://schemas.microsoft.com/office/drawing/2010/main" w="9525">
+                <a14:hiddenLine xmlns:a14="http://schemas.microsoft.com/office/drawing/2010/main" xmlns="" w="9525">
                   <a:solidFill>
                     <a:srgbClr val="000000"/>
                   </a:solidFill>
@@ -4141,7 +4141,7 @@
             </a:ln>
             <a:extLst>
               <a:ext uri="{91240B29-F687-4f45-9708-019B960494DF}">
-                <a14:hiddenLine xmlns="" xmlns:a14="http://schemas.microsoft.com/office/drawing/2010/main" w="9525">
+                <a14:hiddenLine xmlns:a14="http://schemas.microsoft.com/office/drawing/2010/main" xmlns="" w="9525">
                   <a:solidFill>
                     <a:srgbClr val="000000"/>
                   </a:solidFill>
@@ -4231,7 +4231,7 @@
             </a:ln>
             <a:extLst>
               <a:ext uri="{91240B29-F687-4f45-9708-019B960494DF}">
-                <a14:hiddenLine xmlns="" xmlns:a14="http://schemas.microsoft.com/office/drawing/2010/main" w="9525">
+                <a14:hiddenLine xmlns:a14="http://schemas.microsoft.com/office/drawing/2010/main" xmlns="" w="9525">
                   <a:solidFill>
                     <a:srgbClr val="000000"/>
                   </a:solidFill>
@@ -4321,7 +4321,7 @@
             </a:ln>
             <a:extLst>
               <a:ext uri="{91240B29-F687-4f45-9708-019B960494DF}">
-                <a14:hiddenLine xmlns="" xmlns:a14="http://schemas.microsoft.com/office/drawing/2010/main" w="9525">
+                <a14:hiddenLine xmlns:a14="http://schemas.microsoft.com/office/drawing/2010/main" xmlns="" w="9525">
                   <a:solidFill>
                     <a:srgbClr val="000000"/>
                   </a:solidFill>
@@ -4383,7 +4383,7 @@
             </a:ln>
             <a:extLst>
               <a:ext uri="{91240B29-F687-4f45-9708-019B960494DF}">
-                <a14:hiddenLine xmlns="" xmlns:a14="http://schemas.microsoft.com/office/drawing/2010/main" w="9525">
+                <a14:hiddenLine xmlns:a14="http://schemas.microsoft.com/office/drawing/2010/main" xmlns="" w="9525">
                   <a:solidFill>
                     <a:srgbClr val="000000"/>
                   </a:solidFill>
@@ -4503,7 +4503,7 @@
             </a:ln>
             <a:extLst>
               <a:ext uri="{91240B29-F687-4f45-9708-019B960494DF}">
-                <a14:hiddenLine xmlns="" xmlns:a14="http://schemas.microsoft.com/office/drawing/2010/main" w="9525">
+                <a14:hiddenLine xmlns:a14="http://schemas.microsoft.com/office/drawing/2010/main" xmlns="" w="9525">
                   <a:solidFill>
                     <a:srgbClr val="000000"/>
                   </a:solidFill>
@@ -4571,7 +4571,7 @@
             </a:ln>
             <a:extLst>
               <a:ext uri="{91240B29-F687-4f45-9708-019B960494DF}">
-                <a14:hiddenLine xmlns="" xmlns:a14="http://schemas.microsoft.com/office/drawing/2010/main" w="9525">
+                <a14:hiddenLine xmlns:a14="http://schemas.microsoft.com/office/drawing/2010/main" xmlns="" w="9525">
                   <a:solidFill>
                     <a:srgbClr val="000000"/>
                   </a:solidFill>
@@ -4661,7 +4661,7 @@
             </a:ln>
             <a:extLst>
               <a:ext uri="{91240B29-F687-4f45-9708-019B960494DF}">
-                <a14:hiddenLine xmlns="" xmlns:a14="http://schemas.microsoft.com/office/drawing/2010/main" w="9525">
+                <a14:hiddenLine xmlns:a14="http://schemas.microsoft.com/office/drawing/2010/main" xmlns="" w="9525">
                   <a:solidFill>
                     <a:srgbClr val="000000"/>
                   </a:solidFill>
@@ -4801,7 +4801,7 @@
           <a:p>
             <a:fld id="{48A87A34-81AB-432B-8DAE-1953F412C126}" type="datetimeFigureOut">
               <a:rPr lang="en-US" dirty="0"/>
-              <a:t>2/7/2018</a:t>
+              <a:t>1/20/2018</a:t>
             </a:fld>
             <a:endParaRPr lang="en-US"/>
           </a:p>
@@ -5063,7 +5063,7 @@
           <a:p>
             <a:fld id="{48A87A34-81AB-432B-8DAE-1953F412C126}" type="datetimeFigureOut">
               <a:rPr lang="en-US" dirty="0"/>
-              <a:t>2/7/2018</a:t>
+              <a:t>1/20/2018</a:t>
             </a:fld>
             <a:endParaRPr lang="en-US"/>
           </a:p>
@@ -5254,7 +5254,7 @@
           <a:p>
             <a:fld id="{48A87A34-81AB-432B-8DAE-1953F412C126}" type="datetimeFigureOut">
               <a:rPr lang="en-US" dirty="0"/>
-              <a:t>2/7/2018</a:t>
+              <a:t>1/20/2018</a:t>
             </a:fld>
             <a:endParaRPr lang="en-US"/>
           </a:p>
@@ -5512,7 +5512,7 @@
           <a:p>
             <a:fld id="{48A87A34-81AB-432B-8DAE-1953F412C126}" type="datetimeFigureOut">
               <a:rPr lang="en-US" dirty="0"/>
-              <a:t>2/7/2018</a:t>
+              <a:t>1/20/2018</a:t>
             </a:fld>
             <a:endParaRPr lang="en-US"/>
           </a:p>
@@ -5941,7 +5941,7 @@
           <a:p>
             <a:fld id="{48A87A34-81AB-432B-8DAE-1953F412C126}" type="datetimeFigureOut">
               <a:rPr lang="en-US" dirty="0"/>
-              <a:t>2/7/2018</a:t>
+              <a:t>1/20/2018</a:t>
             </a:fld>
             <a:endParaRPr lang="en-US"/>
           </a:p>
@@ -6482,7 +6482,7 @@
           <a:p>
             <a:fld id="{48A87A34-81AB-432B-8DAE-1953F412C126}" type="datetimeFigureOut">
               <a:rPr lang="en-US" dirty="0"/>
-              <a:t>2/7/2018</a:t>
+              <a:t>1/20/2018</a:t>
             </a:fld>
             <a:endParaRPr lang="en-US"/>
           </a:p>
@@ -7197,7 +7197,7 @@
           <a:p>
             <a:fld id="{48A87A34-81AB-432B-8DAE-1953F412C126}" type="datetimeFigureOut">
               <a:rPr lang="en-US" dirty="0"/>
-              <a:t>2/7/2018</a:t>
+              <a:t>1/20/2018</a:t>
             </a:fld>
             <a:endParaRPr lang="en-US"/>
           </a:p>
@@ -7362,7 +7362,7 @@
           <a:p>
             <a:fld id="{48A87A34-81AB-432B-8DAE-1953F412C126}" type="datetimeFigureOut">
               <a:rPr lang="en-US" dirty="0"/>
-              <a:t>2/7/2018</a:t>
+              <a:t>1/20/2018</a:t>
             </a:fld>
             <a:endParaRPr lang="en-US"/>
           </a:p>
@@ -7537,7 +7537,7 @@
           <a:p>
             <a:fld id="{48A87A34-81AB-432B-8DAE-1953F412C126}" type="datetimeFigureOut">
               <a:rPr lang="en-US" dirty="0"/>
-              <a:t>2/7/2018</a:t>
+              <a:t>1/20/2018</a:t>
             </a:fld>
             <a:endParaRPr lang="en-US"/>
           </a:p>
@@ -7702,7 +7702,7 @@
           <a:p>
             <a:fld id="{48A87A34-81AB-432B-8DAE-1953F412C126}" type="datetimeFigureOut">
               <a:rPr lang="en-US" dirty="0"/>
-              <a:t>2/7/2018</a:t>
+              <a:t>1/20/2018</a:t>
             </a:fld>
             <a:endParaRPr lang="en-US"/>
           </a:p>
@@ -7947,7 +7947,7 @@
           <a:p>
             <a:fld id="{48A87A34-81AB-432B-8DAE-1953F412C126}" type="datetimeFigureOut">
               <a:rPr lang="en-US" dirty="0"/>
-              <a:t>2/7/2018</a:t>
+              <a:t>1/20/2018</a:t>
             </a:fld>
             <a:endParaRPr lang="en-US"/>
           </a:p>
@@ -8174,7 +8174,7 @@
           <a:p>
             <a:fld id="{48A87A34-81AB-432B-8DAE-1953F412C126}" type="datetimeFigureOut">
               <a:rPr lang="en-US" dirty="0"/>
-              <a:t>2/7/2018</a:t>
+              <a:t>1/20/2018</a:t>
             </a:fld>
             <a:endParaRPr lang="en-US"/>
           </a:p>
@@ -8550,7 +8550,7 @@
           <a:p>
             <a:fld id="{48A87A34-81AB-432B-8DAE-1953F412C126}" type="datetimeFigureOut">
               <a:rPr lang="en-US" dirty="0"/>
-              <a:t>2/7/2018</a:t>
+              <a:t>1/20/2018</a:t>
             </a:fld>
             <a:endParaRPr lang="en-US"/>
           </a:p>
@@ -8663,7 +8663,7 @@
           <a:p>
             <a:fld id="{48A87A34-81AB-432B-8DAE-1953F412C126}" type="datetimeFigureOut">
               <a:rPr lang="en-US" dirty="0"/>
-              <a:t>2/7/2018</a:t>
+              <a:t>1/20/2018</a:t>
             </a:fld>
             <a:endParaRPr lang="en-US"/>
           </a:p>
@@ -8753,7 +8753,7 @@
           <a:p>
             <a:fld id="{48A87A34-81AB-432B-8DAE-1953F412C126}" type="datetimeFigureOut">
               <a:rPr lang="en-US" dirty="0"/>
-              <a:t>2/7/2018</a:t>
+              <a:t>1/20/2018</a:t>
             </a:fld>
             <a:endParaRPr lang="en-US"/>
           </a:p>
@@ -8997,7 +8997,7 @@
           <a:p>
             <a:fld id="{48A87A34-81AB-432B-8DAE-1953F412C126}" type="datetimeFigureOut">
               <a:rPr lang="en-US" dirty="0"/>
-              <a:t>2/7/2018</a:t>
+              <a:t>1/20/2018</a:t>
             </a:fld>
             <a:endParaRPr lang="en-US"/>
           </a:p>
@@ -9272,7 +9272,7 @@
           <a:p>
             <a:fld id="{48A87A34-81AB-432B-8DAE-1953F412C126}" type="datetimeFigureOut">
               <a:rPr lang="en-US" dirty="0"/>
-              <a:t>2/7/2018</a:t>
+              <a:t>1/20/2018</a:t>
             </a:fld>
             <a:endParaRPr lang="en-US"/>
           </a:p>
@@ -9383,7 +9383,7 @@
           <a:noFill/>
           <a:extLst>
             <a:ext uri="{909E8E84-426E-40dd-AFC4-6F175D3DCCD1}">
-              <a14:hiddenFill xmlns="" xmlns:a14="http://schemas.microsoft.com/office/drawing/2010/main">
+              <a14:hiddenFill xmlns:a14="http://schemas.microsoft.com/office/drawing/2010/main" xmlns="">
                 <a:solidFill>
                   <a:srgbClr val="FFFFFF"/>
                 </a:solidFill>
@@ -9457,7 +9457,7 @@
               </a:ln>
               <a:extLst>
                 <a:ext uri="{91240B29-F687-4f45-9708-019B960494DF}">
-                  <a14:hiddenLine xmlns="" xmlns:a14="http://schemas.microsoft.com/office/drawing/2010/main" w="9525">
+                  <a14:hiddenLine xmlns:a14="http://schemas.microsoft.com/office/drawing/2010/main" xmlns="" w="9525">
                     <a:solidFill>
                       <a:srgbClr val="000000"/>
                     </a:solidFill>
@@ -9547,7 +9547,7 @@
               </a:ln>
               <a:extLst>
                 <a:ext uri="{91240B29-F687-4f45-9708-019B960494DF}">
-                  <a14:hiddenLine xmlns="" xmlns:a14="http://schemas.microsoft.com/office/drawing/2010/main" w="9525">
+                  <a14:hiddenLine xmlns:a14="http://schemas.microsoft.com/office/drawing/2010/main" xmlns="" w="9525">
                     <a:solidFill>
                       <a:srgbClr val="000000"/>
                     </a:solidFill>
@@ -9637,7 +9637,7 @@
               </a:ln>
               <a:extLst>
                 <a:ext uri="{91240B29-F687-4f45-9708-019B960494DF}">
-                  <a14:hiddenLine xmlns="" xmlns:a14="http://schemas.microsoft.com/office/drawing/2010/main" w="9525">
+                  <a14:hiddenLine xmlns:a14="http://schemas.microsoft.com/office/drawing/2010/main" xmlns="" w="9525">
                     <a:solidFill>
                       <a:srgbClr val="000000"/>
                     </a:solidFill>
@@ -9699,7 +9699,7 @@
               </a:ln>
               <a:extLst>
                 <a:ext uri="{91240B29-F687-4f45-9708-019B960494DF}">
-                  <a14:hiddenLine xmlns="" xmlns:a14="http://schemas.microsoft.com/office/drawing/2010/main" w="9525">
+                  <a14:hiddenLine xmlns:a14="http://schemas.microsoft.com/office/drawing/2010/main" xmlns="" w="9525">
                     <a:solidFill>
                       <a:srgbClr val="000000"/>
                     </a:solidFill>
@@ -9789,7 +9789,7 @@
               </a:ln>
               <a:extLst>
                 <a:ext uri="{91240B29-F687-4f45-9708-019B960494DF}">
-                  <a14:hiddenLine xmlns="" xmlns:a14="http://schemas.microsoft.com/office/drawing/2010/main" w="9525">
+                  <a14:hiddenLine xmlns:a14="http://schemas.microsoft.com/office/drawing/2010/main" xmlns="" w="9525">
                     <a:solidFill>
                       <a:srgbClr val="000000"/>
                     </a:solidFill>
@@ -9851,7 +9851,7 @@
               </a:ln>
               <a:extLst>
                 <a:ext uri="{91240B29-F687-4f45-9708-019B960494DF}">
-                  <a14:hiddenLine xmlns="" xmlns:a14="http://schemas.microsoft.com/office/drawing/2010/main" w="9525">
+                  <a14:hiddenLine xmlns:a14="http://schemas.microsoft.com/office/drawing/2010/main" xmlns="" w="9525">
                     <a:solidFill>
                       <a:srgbClr val="000000"/>
                     </a:solidFill>
@@ -9913,7 +9913,7 @@
               </a:ln>
               <a:extLst>
                 <a:ext uri="{91240B29-F687-4f45-9708-019B960494DF}">
-                  <a14:hiddenLine xmlns="" xmlns:a14="http://schemas.microsoft.com/office/drawing/2010/main" w="9525">
+                  <a14:hiddenLine xmlns:a14="http://schemas.microsoft.com/office/drawing/2010/main" xmlns="" w="9525">
                     <a:solidFill>
                       <a:srgbClr val="000000"/>
                     </a:solidFill>
@@ -10003,7 +10003,7 @@
               </a:ln>
               <a:extLst>
                 <a:ext uri="{91240B29-F687-4f45-9708-019B960494DF}">
-                  <a14:hiddenLine xmlns="" xmlns:a14="http://schemas.microsoft.com/office/drawing/2010/main" w="9525">
+                  <a14:hiddenLine xmlns:a14="http://schemas.microsoft.com/office/drawing/2010/main" xmlns="" w="9525">
                     <a:solidFill>
                       <a:srgbClr val="000000"/>
                     </a:solidFill>
@@ -10093,7 +10093,7 @@
               </a:ln>
               <a:extLst>
                 <a:ext uri="{91240B29-F687-4f45-9708-019B960494DF}">
-                  <a14:hiddenLine xmlns="" xmlns:a14="http://schemas.microsoft.com/office/drawing/2010/main" w="9525">
+                  <a14:hiddenLine xmlns:a14="http://schemas.microsoft.com/office/drawing/2010/main" xmlns="" w="9525">
                     <a:solidFill>
                       <a:srgbClr val="000000"/>
                     </a:solidFill>
@@ -10155,7 +10155,7 @@
               </a:ln>
               <a:extLst>
                 <a:ext uri="{91240B29-F687-4f45-9708-019B960494DF}">
-                  <a14:hiddenLine xmlns="" xmlns:a14="http://schemas.microsoft.com/office/drawing/2010/main" w="9525">
+                  <a14:hiddenLine xmlns:a14="http://schemas.microsoft.com/office/drawing/2010/main" xmlns="" w="9525">
                     <a:solidFill>
                       <a:srgbClr val="000000"/>
                     </a:solidFill>
@@ -10265,7 +10265,7 @@
               </a:ln>
               <a:extLst>
                 <a:ext uri="{91240B29-F687-4f45-9708-019B960494DF}">
-                  <a14:hiddenLine xmlns="" xmlns:a14="http://schemas.microsoft.com/office/drawing/2010/main" w="9525">
+                  <a14:hiddenLine xmlns:a14="http://schemas.microsoft.com/office/drawing/2010/main" xmlns="" w="9525">
                     <a:solidFill>
                       <a:srgbClr val="000000"/>
                     </a:solidFill>
@@ -10349,7 +10349,7 @@
               </a:ln>
               <a:extLst>
                 <a:ext uri="{91240B29-F687-4f45-9708-019B960494DF}">
-                  <a14:hiddenLine xmlns="" xmlns:a14="http://schemas.microsoft.com/office/drawing/2010/main" w="9525">
+                  <a14:hiddenLine xmlns:a14="http://schemas.microsoft.com/office/drawing/2010/main" xmlns="" w="9525">
                     <a:solidFill>
                       <a:srgbClr val="000000"/>
                     </a:solidFill>
@@ -10411,7 +10411,7 @@
               </a:ln>
               <a:extLst>
                 <a:ext uri="{91240B29-F687-4f45-9708-019B960494DF}">
-                  <a14:hiddenLine xmlns="" xmlns:a14="http://schemas.microsoft.com/office/drawing/2010/main" w="9525">
+                  <a14:hiddenLine xmlns:a14="http://schemas.microsoft.com/office/drawing/2010/main" xmlns="" w="9525">
                     <a:solidFill>
                       <a:srgbClr val="000000"/>
                     </a:solidFill>
@@ -10473,7 +10473,7 @@
               </a:ln>
               <a:extLst>
                 <a:ext uri="{91240B29-F687-4f45-9708-019B960494DF}">
-                  <a14:hiddenLine xmlns="" xmlns:a14="http://schemas.microsoft.com/office/drawing/2010/main" w="9525">
+                  <a14:hiddenLine xmlns:a14="http://schemas.microsoft.com/office/drawing/2010/main" xmlns="" w="9525">
                     <a:solidFill>
                       <a:srgbClr val="000000"/>
                     </a:solidFill>
@@ -10563,7 +10563,7 @@
               </a:ln>
               <a:extLst>
                 <a:ext uri="{91240B29-F687-4f45-9708-019B960494DF}">
-                  <a14:hiddenLine xmlns="" xmlns:a14="http://schemas.microsoft.com/office/drawing/2010/main" w="9525">
+                  <a14:hiddenLine xmlns:a14="http://schemas.microsoft.com/office/drawing/2010/main" xmlns="" w="9525">
                     <a:solidFill>
                       <a:srgbClr val="000000"/>
                     </a:solidFill>
@@ -10597,7 +10597,7 @@
               </a:ln>
               <a:extLst>
                 <a:ext uri="{91240B29-F687-4f45-9708-019B960494DF}">
-                  <a14:hiddenLine xmlns="" xmlns:a14="http://schemas.microsoft.com/office/drawing/2010/main" w="9525">
+                  <a14:hiddenLine xmlns:a14="http://schemas.microsoft.com/office/drawing/2010/main" xmlns="" w="9525">
                     <a:solidFill>
                       <a:srgbClr val="000000"/>
                     </a:solidFill>
@@ -10662,7 +10662,7 @@
               </a:ln>
               <a:extLst>
                 <a:ext uri="{91240B29-F687-4f45-9708-019B960494DF}">
-                  <a14:hiddenLine xmlns="" xmlns:a14="http://schemas.microsoft.com/office/drawing/2010/main" w="9525">
+                  <a14:hiddenLine xmlns:a14="http://schemas.microsoft.com/office/drawing/2010/main" xmlns="" w="9525">
                     <a:solidFill>
                       <a:srgbClr val="000000"/>
                     </a:solidFill>
@@ -10752,7 +10752,7 @@
               </a:ln>
               <a:extLst>
                 <a:ext uri="{91240B29-F687-4f45-9708-019B960494DF}">
-                  <a14:hiddenLine xmlns="" xmlns:a14="http://schemas.microsoft.com/office/drawing/2010/main" w="9525">
+                  <a14:hiddenLine xmlns:a14="http://schemas.microsoft.com/office/drawing/2010/main" xmlns="" w="9525">
                     <a:solidFill>
                       <a:srgbClr val="000000"/>
                     </a:solidFill>
@@ -10814,7 +10814,7 @@
               </a:ln>
               <a:extLst>
                 <a:ext uri="{91240B29-F687-4f45-9708-019B960494DF}">
-                  <a14:hiddenLine xmlns="" xmlns:a14="http://schemas.microsoft.com/office/drawing/2010/main" w="9525">
+                  <a14:hiddenLine xmlns:a14="http://schemas.microsoft.com/office/drawing/2010/main" xmlns="" w="9525">
                     <a:solidFill>
                       <a:srgbClr val="000000"/>
                     </a:solidFill>
@@ -10904,7 +10904,7 @@
               </a:ln>
               <a:extLst>
                 <a:ext uri="{91240B29-F687-4f45-9708-019B960494DF}">
-                  <a14:hiddenLine xmlns="" xmlns:a14="http://schemas.microsoft.com/office/drawing/2010/main" w="9525">
+                  <a14:hiddenLine xmlns:a14="http://schemas.microsoft.com/office/drawing/2010/main" xmlns="" w="9525">
                     <a:solidFill>
                       <a:srgbClr val="000000"/>
                     </a:solidFill>
@@ -10969,7 +10969,7 @@
               </a:ln>
               <a:extLst>
                 <a:ext uri="{91240B29-F687-4f45-9708-019B960494DF}">
-                  <a14:hiddenLine xmlns="" xmlns:a14="http://schemas.microsoft.com/office/drawing/2010/main" w="9525">
+                  <a14:hiddenLine xmlns:a14="http://schemas.microsoft.com/office/drawing/2010/main" xmlns="" w="9525">
                     <a:solidFill>
                       <a:srgbClr val="000000"/>
                     </a:solidFill>
@@ -11031,7 +11031,7 @@
               </a:ln>
               <a:extLst>
                 <a:ext uri="{91240B29-F687-4f45-9708-019B960494DF}">
-                  <a14:hiddenLine xmlns="" xmlns:a14="http://schemas.microsoft.com/office/drawing/2010/main" w="9525">
+                  <a14:hiddenLine xmlns:a14="http://schemas.microsoft.com/office/drawing/2010/main" xmlns="" w="9525">
                     <a:solidFill>
                       <a:srgbClr val="000000"/>
                     </a:solidFill>
@@ -11121,7 +11121,7 @@
               </a:ln>
               <a:extLst>
                 <a:ext uri="{91240B29-F687-4f45-9708-019B960494DF}">
-                  <a14:hiddenLine xmlns="" xmlns:a14="http://schemas.microsoft.com/office/drawing/2010/main" w="9525">
+                  <a14:hiddenLine xmlns:a14="http://schemas.microsoft.com/office/drawing/2010/main" xmlns="" w="9525">
                     <a:solidFill>
                       <a:srgbClr val="000000"/>
                     </a:solidFill>
@@ -11211,7 +11211,7 @@
               </a:ln>
               <a:extLst>
                 <a:ext uri="{91240B29-F687-4f45-9708-019B960494DF}">
-                  <a14:hiddenLine xmlns="" xmlns:a14="http://schemas.microsoft.com/office/drawing/2010/main" w="9525">
+                  <a14:hiddenLine xmlns:a14="http://schemas.microsoft.com/office/drawing/2010/main" xmlns="" w="9525">
                     <a:solidFill>
                       <a:srgbClr val="000000"/>
                     </a:solidFill>
@@ -11276,7 +11276,7 @@
               </a:ln>
               <a:extLst>
                 <a:ext uri="{91240B29-F687-4f45-9708-019B960494DF}">
-                  <a14:hiddenLine xmlns="" xmlns:a14="http://schemas.microsoft.com/office/drawing/2010/main" w="9525">
+                  <a14:hiddenLine xmlns:a14="http://schemas.microsoft.com/office/drawing/2010/main" xmlns="" w="9525">
                     <a:solidFill>
                       <a:srgbClr val="000000"/>
                     </a:solidFill>
@@ -11396,7 +11396,7 @@
               </a:ln>
               <a:extLst>
                 <a:ext uri="{91240B29-F687-4f45-9708-019B960494DF}">
-                  <a14:hiddenLine xmlns="" xmlns:a14="http://schemas.microsoft.com/office/drawing/2010/main" w="9525">
+                  <a14:hiddenLine xmlns:a14="http://schemas.microsoft.com/office/drawing/2010/main" xmlns="" w="9525">
                     <a:solidFill>
                       <a:srgbClr val="000000"/>
                     </a:solidFill>
@@ -11494,7 +11494,7 @@
               </a:ln>
               <a:extLst>
                 <a:ext uri="{91240B29-F687-4f45-9708-019B960494DF}">
-                  <a14:hiddenLine xmlns="" xmlns:a14="http://schemas.microsoft.com/office/drawing/2010/main" w="9525">
+                  <a14:hiddenLine xmlns:a14="http://schemas.microsoft.com/office/drawing/2010/main" xmlns="" w="9525">
                     <a:solidFill>
                       <a:srgbClr val="000000"/>
                     </a:solidFill>
@@ -11609,7 +11609,7 @@
               </a:ln>
               <a:extLst>
                 <a:ext uri="{91240B29-F687-4f45-9708-019B960494DF}">
-                  <a14:hiddenLine xmlns="" xmlns:a14="http://schemas.microsoft.com/office/drawing/2010/main" w="9525">
+                  <a14:hiddenLine xmlns:a14="http://schemas.microsoft.com/office/drawing/2010/main" xmlns="" w="9525">
                     <a:solidFill>
                       <a:srgbClr val="000000"/>
                     </a:solidFill>
@@ -11699,7 +11699,7 @@
               </a:ln>
               <a:extLst>
                 <a:ext uri="{91240B29-F687-4f45-9708-019B960494DF}">
-                  <a14:hiddenLine xmlns="" xmlns:a14="http://schemas.microsoft.com/office/drawing/2010/main" w="9525">
+                  <a14:hiddenLine xmlns:a14="http://schemas.microsoft.com/office/drawing/2010/main" xmlns="" w="9525">
                     <a:solidFill>
                       <a:srgbClr val="000000"/>
                     </a:solidFill>
@@ -11764,7 +11764,7 @@
               </a:ln>
               <a:extLst>
                 <a:ext uri="{91240B29-F687-4f45-9708-019B960494DF}">
-                  <a14:hiddenLine xmlns="" xmlns:a14="http://schemas.microsoft.com/office/drawing/2010/main" w="9525">
+                  <a14:hiddenLine xmlns:a14="http://schemas.microsoft.com/office/drawing/2010/main" xmlns="" w="9525">
                     <a:solidFill>
                       <a:srgbClr val="000000"/>
                     </a:solidFill>
@@ -11854,7 +11854,7 @@
               </a:ln>
               <a:extLst>
                 <a:ext uri="{91240B29-F687-4f45-9708-019B960494DF}">
-                  <a14:hiddenLine xmlns="" xmlns:a14="http://schemas.microsoft.com/office/drawing/2010/main" w="9525">
+                  <a14:hiddenLine xmlns:a14="http://schemas.microsoft.com/office/drawing/2010/main" xmlns="" w="9525">
                     <a:solidFill>
                       <a:srgbClr val="000000"/>
                     </a:solidFill>
@@ -11922,7 +11922,7 @@
               </a:ln>
               <a:extLst>
                 <a:ext uri="{91240B29-F687-4f45-9708-019B960494DF}">
-                  <a14:hiddenLine xmlns="" xmlns:a14="http://schemas.microsoft.com/office/drawing/2010/main" w="9525">
+                  <a14:hiddenLine xmlns:a14="http://schemas.microsoft.com/office/drawing/2010/main" xmlns="" w="9525">
                     <a:solidFill>
                       <a:srgbClr val="000000"/>
                     </a:solidFill>
@@ -12012,7 +12012,7 @@
               </a:ln>
               <a:extLst>
                 <a:ext uri="{91240B29-F687-4f45-9708-019B960494DF}">
-                  <a14:hiddenLine xmlns="" xmlns:a14="http://schemas.microsoft.com/office/drawing/2010/main" w="9525">
+                  <a14:hiddenLine xmlns:a14="http://schemas.microsoft.com/office/drawing/2010/main" xmlns="" w="9525">
                     <a:solidFill>
                       <a:srgbClr val="000000"/>
                     </a:solidFill>
@@ -12080,7 +12080,7 @@
               </a:ln>
               <a:extLst>
                 <a:ext uri="{91240B29-F687-4f45-9708-019B960494DF}">
-                  <a14:hiddenLine xmlns="" xmlns:a14="http://schemas.microsoft.com/office/drawing/2010/main" w="9525">
+                  <a14:hiddenLine xmlns:a14="http://schemas.microsoft.com/office/drawing/2010/main" xmlns="" w="9525">
                     <a:solidFill>
                       <a:srgbClr val="000000"/>
                     </a:solidFill>
@@ -12170,7 +12170,7 @@
               </a:ln>
               <a:extLst>
                 <a:ext uri="{91240B29-F687-4f45-9708-019B960494DF}">
-                  <a14:hiddenLine xmlns="" xmlns:a14="http://schemas.microsoft.com/office/drawing/2010/main" w="9525">
+                  <a14:hiddenLine xmlns:a14="http://schemas.microsoft.com/office/drawing/2010/main" xmlns="" w="9525">
                     <a:solidFill>
                       <a:srgbClr val="000000"/>
                     </a:solidFill>
@@ -12204,7 +12204,7 @@
               </a:ln>
               <a:extLst>
                 <a:ext uri="{91240B29-F687-4f45-9708-019B960494DF}">
-                  <a14:hiddenLine xmlns="" xmlns:a14="http://schemas.microsoft.com/office/drawing/2010/main" w="9525">
+                  <a14:hiddenLine xmlns:a14="http://schemas.microsoft.com/office/drawing/2010/main" xmlns="" w="9525">
                     <a:solidFill>
                       <a:srgbClr val="000000"/>
                     </a:solidFill>
@@ -12345,7 +12345,7 @@
             <a:fld id="{48A87A34-81AB-432B-8DAE-1953F412C126}" type="datetimeFigureOut">
               <a:rPr lang="en-US" dirty="0"/>
               <a:pPr/>
-              <a:t>2/7/2018</a:t>
+              <a:t>1/20/2018</a:t>
             </a:fld>
             <a:endParaRPr lang="en-US"/>
           </a:p>
@@ -13034,14 +13034,10 @@
           <a:lstStyle/>
           <a:p>
             <a:r>
-              <a:rPr lang="fi-FI" dirty="0"/>
-              <a:t>Sprint 1	</a:t>
-            </a:r>
-            <a:r>
-              <a:rPr lang="fi-FI" sz="2000" dirty="0"/>
-              <a:t>(17.-31.1.2018 – TOTEUTUNUT AIKATAULUSSA)</a:t>
-            </a:r>
-            <a:endParaRPr lang="en-US" dirty="0"/>
+              <a:rPr lang="fi-FI"/>
+              <a:t>Sprint 1</a:t>
+            </a:r>
+            <a:endParaRPr lang="en-US"/>
           </a:p>
         </p:txBody>
       </p:sp>
@@ -13069,74 +13065,57 @@
           <a:lstStyle/>
           <a:p>
             <a:r>
-              <a:rPr lang="fi-FI" dirty="0"/>
+              <a:rPr lang="fi-FI"/>
               <a:t>JAVA konsolisovellus, jossa sisäänkirjautuminen ja perustoiminnot</a:t>
             </a:r>
           </a:p>
           <a:p>
             <a:pPr lvl="1"/>
             <a:r>
-              <a:rPr lang="fi-FI" dirty="0"/>
+              <a:rPr lang="fi-FI"/>
               <a:t>help, </a:t>
             </a:r>
             <a:r>
-              <a:rPr lang="fi-FI" dirty="0" err="1"/>
+              <a:rPr lang="fi-FI" err="1"/>
               <a:t>fileout</a:t>
             </a:r>
             <a:r>
-              <a:rPr lang="fi-FI" dirty="0"/>
+              <a:rPr lang="fi-FI"/>
               <a:t> </a:t>
             </a:r>
             <a:r>
-              <a:rPr lang="fi-FI" dirty="0" err="1"/>
+              <a:rPr lang="fi-FI" err="1"/>
               <a:t>console</a:t>
             </a:r>
             <a:r>
-              <a:rPr lang="fi-FI" dirty="0"/>
+              <a:rPr lang="fi-FI"/>
               <a:t>/</a:t>
             </a:r>
             <a:r>
-              <a:rPr lang="fi-FI" dirty="0" err="1"/>
+              <a:rPr lang="fi-FI" err="1"/>
               <a:t>users</a:t>
             </a:r>
             <a:r>
-              <a:rPr lang="fi-FI" dirty="0"/>
+              <a:rPr lang="fi-FI"/>
               <a:t>, </a:t>
             </a:r>
             <a:r>
-              <a:rPr lang="fi-FI" dirty="0" err="1"/>
+              <a:rPr lang="fi-FI" err="1"/>
               <a:t>exit</a:t>
             </a:r>
-            <a:endParaRPr lang="fi-FI" dirty="0"/>
-          </a:p>
-          <a:p>
-            <a:r>
-              <a:rPr lang="fi-FI" dirty="0"/>
+          </a:p>
+          <a:p>
+            <a:r>
+              <a:rPr lang="fi-FI"/>
               <a:t>Kirjautumisvirheiden tallennus lokitiedostoon (.txt)</a:t>
             </a:r>
           </a:p>
           <a:p>
             <a:r>
-              <a:rPr lang="fi-FI" dirty="0"/>
+              <a:rPr lang="fi-FI"/>
               <a:t>Konsolin tulostus tiedostoon (.txt)</a:t>
             </a:r>
-          </a:p>
-          <a:p>
-            <a:pPr lvl="1"/>
-            <a:r>
-              <a:rPr lang="fi-FI" dirty="0">
-                <a:sym typeface="Wingdings" panose="05000000000000000000" pitchFamily="2" charset="2"/>
-              </a:rPr>
-              <a:t></a:t>
-            </a:r>
-            <a:r>
-              <a:rPr lang="fi-FI" dirty="0"/>
-              <a:t> Toteutettu komentohistorian tulostuksella tiedostoon</a:t>
-            </a:r>
-          </a:p>
-          <a:p>
-            <a:pPr lvl="1"/>
-            <a:endParaRPr lang="en-US" dirty="0"/>
+            <a:endParaRPr lang="en-US"/>
           </a:p>
         </p:txBody>
       </p:sp>
@@ -13215,12 +13194,7 @@
             <p:ph idx="1"/>
           </p:nvPr>
         </p:nvSpPr>
-        <p:spPr>
-          <a:xfrm>
-            <a:off x="1141412" y="2249487"/>
-            <a:ext cx="10330152" cy="3541714"/>
-          </a:xfrm>
-        </p:spPr>
+        <p:spPr/>
         <p:txBody>
           <a:bodyPr vert="horz" lIns="91440" tIns="45720" rIns="91440" bIns="45720" rtlCol="0" anchor="t">
             <a:normAutofit lnSpcReduction="10000"/>
@@ -13228,113 +13202,94 @@
           <a:lstStyle/>
           <a:p>
             <a:r>
-              <a:rPr lang="fi-FI" dirty="0"/>
+              <a:rPr lang="fi-FI"/>
               <a:t>Tietokantayhteys</a:t>
             </a:r>
-            <a:endParaRPr lang="en-US" dirty="0"/>
+            <a:endParaRPr lang="en-US"/>
           </a:p>
           <a:p>
             <a:pPr lvl="1"/>
             <a:r>
-              <a:rPr lang="fi-FI" dirty="0"/>
-              <a:t>Kirjautumistunnusten siirto tietokantaan						</a:t>
-            </a:r>
-            <a:r>
-              <a:rPr lang="fi-FI" dirty="0">
-                <a:sym typeface="Wingdings" panose="05000000000000000000" pitchFamily="2" charset="2"/>
-              </a:rPr>
-              <a:t> Valmis</a:t>
-            </a:r>
-            <a:endParaRPr lang="fi-FI" dirty="0"/>
+              <a:rPr lang="fi-FI"/>
+              <a:t>Kirjautumistunnusten siirto tietokantaan</a:t>
+            </a:r>
           </a:p>
           <a:p>
             <a:pPr lvl="1">
               <a:buFont typeface="Arial"/>
             </a:pPr>
             <a:r>
-              <a:rPr lang="fi-FI" dirty="0"/>
-              <a:t>Käyttäjätunnukset ja eri oikeudet "anturikäyttäjille" ja asiakkaille			</a:t>
-            </a:r>
-            <a:r>
-              <a:rPr lang="fi-FI">
-                <a:sym typeface="Wingdings" panose="05000000000000000000" pitchFamily="2" charset="2"/>
-              </a:rPr>
-              <a:t> Valmis</a:t>
-            </a:r>
-            <a:endParaRPr lang="en-US" dirty="0"/>
+              <a:rPr lang="fi-FI"/>
+              <a:t>Käyttäjätunnukset ja eri oikeudet "anturikäyttäjille" ja asiakkaille</a:t>
+            </a:r>
+            <a:endParaRPr lang="en-US"/>
           </a:p>
           <a:p>
             <a:pPr lvl="1">
               <a:buFont typeface="Arial"/>
             </a:pPr>
             <a:r>
-              <a:rPr lang="fi-FI" dirty="0"/>
-              <a:t>Oma taulu lämpötiloille, jossa generoitua dataa				</a:t>
-            </a:r>
-            <a:r>
-              <a:rPr lang="fi-FI" dirty="0">
-                <a:sym typeface="Wingdings" panose="05000000000000000000" pitchFamily="2" charset="2"/>
-              </a:rPr>
-              <a:t> Valmis</a:t>
-            </a:r>
-            <a:endParaRPr lang="en-US" dirty="0"/>
+              <a:rPr lang="fi-FI"/>
+              <a:t>Oma taulu lämpötiloille, jossa generoitua dataa</a:t>
+            </a:r>
+            <a:endParaRPr lang="en-US"/>
           </a:p>
           <a:p>
             <a:pPr lvl="1">
               <a:buFont typeface="Arial"/>
             </a:pPr>
             <a:r>
-              <a:rPr lang="fi-FI" dirty="0"/>
+              <a:rPr lang="fi-FI"/>
               <a:t>Haku lämpötilojen ja käyttäjien tauluista tulostettuna konsoliin</a:t>
             </a:r>
-            <a:endParaRPr lang="en-US" dirty="0"/>
-          </a:p>
-          <a:p>
-            <a:r>
-              <a:rPr lang="fi-FI" dirty="0"/>
+            <a:endParaRPr lang="en-US"/>
+          </a:p>
+          <a:p>
+            <a:r>
+              <a:rPr lang="fi-FI"/>
               <a:t>Lämpötilojen kirjauspalvelun ohjaus (</a:t>
             </a:r>
             <a:r>
-              <a:rPr lang="fi-FI" dirty="0" err="1"/>
+              <a:rPr lang="fi-FI" err="1"/>
               <a:t>start</a:t>
             </a:r>
             <a:r>
-              <a:rPr lang="fi-FI" dirty="0"/>
+              <a:rPr lang="fi-FI"/>
               <a:t>/stop/</a:t>
             </a:r>
             <a:r>
-              <a:rPr lang="fi-FI" dirty="0" err="1"/>
+              <a:rPr lang="fi-FI" err="1"/>
               <a:t>restart</a:t>
             </a:r>
             <a:r>
-              <a:rPr lang="fi-FI" dirty="0"/>
+              <a:rPr lang="fi-FI"/>
               <a:t>)</a:t>
             </a:r>
           </a:p>
           <a:p>
             <a:pPr lvl="1"/>
             <a:r>
-              <a:rPr lang="fi-FI" dirty="0"/>
+              <a:rPr lang="fi-FI"/>
               <a:t>Omat luokat valmiiksi, käytännössä tulevat käyttöön vasta automatiikan myötä</a:t>
             </a:r>
           </a:p>
           <a:p>
             <a:pPr lvl="1"/>
             <a:r>
-              <a:rPr lang="fi-FI" dirty="0"/>
+              <a:rPr lang="fi-FI"/>
               <a:t>Toimintaa voidaan alkaa kokeilemaan </a:t>
             </a:r>
             <a:r>
-              <a:rPr lang="fi-FI" dirty="0" err="1"/>
+              <a:rPr lang="fi-FI" err="1"/>
               <a:t>tempout</a:t>
             </a:r>
             <a:r>
-              <a:rPr lang="fi-FI" dirty="0"/>
+              <a:rPr lang="fi-FI"/>
               <a:t> -käskyllä kun palvelu "päällä"</a:t>
             </a:r>
           </a:p>
           <a:p>
-            <a:endParaRPr lang="en-US" dirty="0"/>
+            <a:endParaRPr lang="en-US"/>
           </a:p>
         </p:txBody>
       </p:sp>

</xml_diff>